<commit_message>
Unique event registration number added
</commit_message>
<xml_diff>
--- a/Description/ResrvationNewLayout.pptx
+++ b/Description/ResrvationNewLayout.pptx
@@ -17,6 +17,8 @@
     <p:sldId id="264" r:id="rId11"/>
     <p:sldId id="261" r:id="rId12"/>
     <p:sldId id="265" r:id="rId13"/>
+    <p:sldId id="271" r:id="rId14"/>
+    <p:sldId id="272" r:id="rId15"/>
   </p:sldIdLst>
   <p:sldSz cx="12192000" cy="6858000"/>
   <p:notesSz cx="6661150" cy="9866313"/>
@@ -277,7 +279,7 @@
           <a:p>
             <a:fld id="{DDCE6D58-9B57-4731-A47B-3CD41B48F0A9}" type="datetimeFigureOut">
               <a:rPr lang="de-CH" smtClean="0"/>
-              <a:t>19.11.2025</a:t>
+              <a:t>12.12.2025</a:t>
             </a:fld>
             <a:endParaRPr lang="de-CH"/>
           </a:p>
@@ -447,7 +449,7 @@
           <a:p>
             <a:fld id="{DDCE6D58-9B57-4731-A47B-3CD41B48F0A9}" type="datetimeFigureOut">
               <a:rPr lang="de-CH" smtClean="0"/>
-              <a:t>19.11.2025</a:t>
+              <a:t>12.12.2025</a:t>
             </a:fld>
             <a:endParaRPr lang="de-CH"/>
           </a:p>
@@ -627,7 +629,7 @@
           <a:p>
             <a:fld id="{DDCE6D58-9B57-4731-A47B-3CD41B48F0A9}" type="datetimeFigureOut">
               <a:rPr lang="de-CH" smtClean="0"/>
-              <a:t>19.11.2025</a:t>
+              <a:t>12.12.2025</a:t>
             </a:fld>
             <a:endParaRPr lang="de-CH"/>
           </a:p>
@@ -797,7 +799,7 @@
           <a:p>
             <a:fld id="{DDCE6D58-9B57-4731-A47B-3CD41B48F0A9}" type="datetimeFigureOut">
               <a:rPr lang="de-CH" smtClean="0"/>
-              <a:t>19.11.2025</a:t>
+              <a:t>12.12.2025</a:t>
             </a:fld>
             <a:endParaRPr lang="de-CH"/>
           </a:p>
@@ -1043,7 +1045,7 @@
           <a:p>
             <a:fld id="{DDCE6D58-9B57-4731-A47B-3CD41B48F0A9}" type="datetimeFigureOut">
               <a:rPr lang="de-CH" smtClean="0"/>
-              <a:t>19.11.2025</a:t>
+              <a:t>12.12.2025</a:t>
             </a:fld>
             <a:endParaRPr lang="de-CH"/>
           </a:p>
@@ -1275,7 +1277,7 @@
           <a:p>
             <a:fld id="{DDCE6D58-9B57-4731-A47B-3CD41B48F0A9}" type="datetimeFigureOut">
               <a:rPr lang="de-CH" smtClean="0"/>
-              <a:t>19.11.2025</a:t>
+              <a:t>12.12.2025</a:t>
             </a:fld>
             <a:endParaRPr lang="de-CH"/>
           </a:p>
@@ -1642,7 +1644,7 @@
           <a:p>
             <a:fld id="{DDCE6D58-9B57-4731-A47B-3CD41B48F0A9}" type="datetimeFigureOut">
               <a:rPr lang="de-CH" smtClean="0"/>
-              <a:t>19.11.2025</a:t>
+              <a:t>12.12.2025</a:t>
             </a:fld>
             <a:endParaRPr lang="de-CH"/>
           </a:p>
@@ -1760,7 +1762,7 @@
           <a:p>
             <a:fld id="{DDCE6D58-9B57-4731-A47B-3CD41B48F0A9}" type="datetimeFigureOut">
               <a:rPr lang="de-CH" smtClean="0"/>
-              <a:t>19.11.2025</a:t>
+              <a:t>12.12.2025</a:t>
             </a:fld>
             <a:endParaRPr lang="de-CH"/>
           </a:p>
@@ -1855,7 +1857,7 @@
           <a:p>
             <a:fld id="{DDCE6D58-9B57-4731-A47B-3CD41B48F0A9}" type="datetimeFigureOut">
               <a:rPr lang="de-CH" smtClean="0"/>
-              <a:t>19.11.2025</a:t>
+              <a:t>12.12.2025</a:t>
             </a:fld>
             <a:endParaRPr lang="de-CH"/>
           </a:p>
@@ -2132,7 +2134,7 @@
           <a:p>
             <a:fld id="{DDCE6D58-9B57-4731-A47B-3CD41B48F0A9}" type="datetimeFigureOut">
               <a:rPr lang="de-CH" smtClean="0"/>
-              <a:t>19.11.2025</a:t>
+              <a:t>12.12.2025</a:t>
             </a:fld>
             <a:endParaRPr lang="de-CH"/>
           </a:p>
@@ -2385,7 +2387,7 @@
           <a:p>
             <a:fld id="{DDCE6D58-9B57-4731-A47B-3CD41B48F0A9}" type="datetimeFigureOut">
               <a:rPr lang="de-CH" smtClean="0"/>
-              <a:t>19.11.2025</a:t>
+              <a:t>12.12.2025</a:t>
             </a:fld>
             <a:endParaRPr lang="de-CH"/>
           </a:p>
@@ -2598,7 +2600,7 @@
           <a:p>
             <a:fld id="{DDCE6D58-9B57-4731-A47B-3CD41B48F0A9}" type="datetimeFigureOut">
               <a:rPr lang="de-CH" smtClean="0"/>
-              <a:t>19.11.2025</a:t>
+              <a:t>12.12.2025</a:t>
             </a:fld>
             <a:endParaRPr lang="de-CH"/>
           </a:p>
@@ -6716,10 +6718,1985 @@
           <a:chExt cx="0" cy="0"/>
         </a:xfrm>
       </p:grpSpPr>
+      <p:sp>
+        <p:nvSpPr>
+          <p:cNvPr id="2" name="Rechteck 1">
+            <a:extLst>
+              <a:ext uri="{FF2B5EF4-FFF2-40B4-BE49-F238E27FC236}">
+                <a16:creationId xmlns:a16="http://schemas.microsoft.com/office/drawing/2014/main" id="{C0686443-0E20-C80B-3932-0478182B418D}"/>
+              </a:ext>
+            </a:extLst>
+          </p:cNvPr>
+          <p:cNvSpPr/>
+          <p:nvPr/>
+        </p:nvSpPr>
+        <p:spPr>
+          <a:xfrm>
+            <a:off x="7525965" y="687631"/>
+            <a:ext cx="3633873" cy="570469"/>
+          </a:xfrm>
+          <a:prstGeom prst="rect">
+            <a:avLst/>
+          </a:prstGeom>
+          <a:noFill/>
+          <a:ln w="19050">
+            <a:solidFill>
+              <a:schemeClr val="tx1"/>
+            </a:solidFill>
+          </a:ln>
+        </p:spPr>
+        <p:style>
+          <a:lnRef idx="2">
+            <a:schemeClr val="accent1">
+              <a:shade val="50000"/>
+            </a:schemeClr>
+          </a:lnRef>
+          <a:fillRef idx="1">
+            <a:schemeClr val="accent1"/>
+          </a:fillRef>
+          <a:effectRef idx="0">
+            <a:schemeClr val="accent1"/>
+          </a:effectRef>
+          <a:fontRef idx="minor">
+            <a:schemeClr val="lt1"/>
+          </a:fontRef>
+        </p:style>
+        <p:txBody>
+          <a:bodyPr rtlCol="0" anchor="ctr"/>
+          <a:lstStyle/>
+          <a:p>
+            <a:pPr algn="ctr"/>
+            <a:r>
+              <a:rPr lang="de-CH" b="1" dirty="0" err="1">
+                <a:solidFill>
+                  <a:schemeClr val="tx1"/>
+                </a:solidFill>
+                <a:latin typeface="Arial" panose="020B0604020202020204" pitchFamily="34" charset="0"/>
+                <a:cs typeface="Arial" panose="020B0604020202020204" pitchFamily="34" charset="0"/>
+              </a:rPr>
+              <a:t>EventProgramTags</a:t>
+            </a:r>
+            <a:endParaRPr lang="de-CH" b="1" dirty="0">
+              <a:solidFill>
+                <a:schemeClr val="tx1"/>
+              </a:solidFill>
+              <a:latin typeface="Arial" panose="020B0604020202020204" pitchFamily="34" charset="0"/>
+              <a:cs typeface="Arial" panose="020B0604020202020204" pitchFamily="34" charset="0"/>
+            </a:endParaRPr>
+          </a:p>
+          <a:p>
+            <a:pPr algn="ctr"/>
+            <a:r>
+              <a:rPr lang="en-US" sz="1400" dirty="0">
+                <a:solidFill>
+                  <a:schemeClr val="tx1"/>
+                </a:solidFill>
+                <a:latin typeface="Arial" panose="020B0604020202020204" pitchFamily="34" charset="0"/>
+                <a:cs typeface="Arial" panose="020B0604020202020204" pitchFamily="34" charset="0"/>
+              </a:rPr>
+              <a:t>Tags of the XML event program file</a:t>
+            </a:r>
+            <a:endParaRPr lang="de-CH" sz="1400" dirty="0">
+              <a:solidFill>
+                <a:schemeClr val="tx1"/>
+              </a:solidFill>
+              <a:latin typeface="Arial" panose="020B0604020202020204" pitchFamily="34" charset="0"/>
+              <a:cs typeface="Arial" panose="020B0604020202020204" pitchFamily="34" charset="0"/>
+            </a:endParaRPr>
+          </a:p>
+        </p:txBody>
+      </p:sp>
+      <p:sp>
+        <p:nvSpPr>
+          <p:cNvPr id="3" name="Rechteck 2">
+            <a:extLst>
+              <a:ext uri="{FF2B5EF4-FFF2-40B4-BE49-F238E27FC236}">
+                <a16:creationId xmlns:a16="http://schemas.microsoft.com/office/drawing/2014/main" id="{1CC58B58-9F64-A8A2-5EC9-D5770BDA61E5}"/>
+              </a:ext>
+            </a:extLst>
+          </p:cNvPr>
+          <p:cNvSpPr/>
+          <p:nvPr/>
+        </p:nvSpPr>
+        <p:spPr>
+          <a:xfrm>
+            <a:off x="7525965" y="1258100"/>
+            <a:ext cx="3633874" cy="3890326"/>
+          </a:xfrm>
+          <a:prstGeom prst="rect">
+            <a:avLst/>
+          </a:prstGeom>
+          <a:noFill/>
+          <a:ln w="19050">
+            <a:solidFill>
+              <a:schemeClr val="tx1"/>
+            </a:solidFill>
+          </a:ln>
+        </p:spPr>
+        <p:style>
+          <a:lnRef idx="2">
+            <a:schemeClr val="accent1">
+              <a:shade val="50000"/>
+            </a:schemeClr>
+          </a:lnRef>
+          <a:fillRef idx="1">
+            <a:schemeClr val="accent1"/>
+          </a:fillRef>
+          <a:effectRef idx="0">
+            <a:schemeClr val="accent1"/>
+          </a:effectRef>
+          <a:fontRef idx="minor">
+            <a:schemeClr val="lt1"/>
+          </a:fontRef>
+        </p:style>
+        <p:txBody>
+          <a:bodyPr rtlCol="0" anchor="ctr"/>
+          <a:lstStyle/>
+          <a:p>
+            <a:r>
+              <a:rPr lang="en-US" sz="1000" b="1" dirty="0" err="1">
+                <a:solidFill>
+                  <a:schemeClr val="tx1"/>
+                </a:solidFill>
+                <a:latin typeface="Arial" panose="020B0604020202020204" pitchFamily="34" charset="0"/>
+                <a:cs typeface="Arial" panose="020B0604020202020204" pitchFamily="34" charset="0"/>
+              </a:rPr>
+              <a:t>this.m_tag_event</a:t>
+            </a:r>
+            <a:r>
+              <a:rPr lang="en-US" sz="1000" b="1" dirty="0">
+                <a:solidFill>
+                  <a:schemeClr val="tx1"/>
+                </a:solidFill>
+                <a:latin typeface="Arial" panose="020B0604020202020204" pitchFamily="34" charset="0"/>
+                <a:cs typeface="Arial" panose="020B0604020202020204" pitchFamily="34" charset="0"/>
+              </a:rPr>
+              <a:t> = "Event";</a:t>
+            </a:r>
+          </a:p>
+          <a:p>
+            <a:r>
+              <a:rPr lang="en-US" sz="1000" b="1" dirty="0" err="1">
+                <a:solidFill>
+                  <a:schemeClr val="tx1"/>
+                </a:solidFill>
+                <a:latin typeface="Arial" panose="020B0604020202020204" pitchFamily="34" charset="0"/>
+                <a:cs typeface="Arial" panose="020B0604020202020204" pitchFamily="34" charset="0"/>
+              </a:rPr>
+              <a:t>this.m_tag_reg_number</a:t>
+            </a:r>
+            <a:r>
+              <a:rPr lang="en-US" sz="1000" b="1" dirty="0">
+                <a:solidFill>
+                  <a:schemeClr val="tx1"/>
+                </a:solidFill>
+                <a:latin typeface="Arial" panose="020B0604020202020204" pitchFamily="34" charset="0"/>
+                <a:cs typeface="Arial" panose="020B0604020202020204" pitchFamily="34" charset="0"/>
+              </a:rPr>
+              <a:t> = “</a:t>
+            </a:r>
+            <a:r>
+              <a:rPr lang="en-US" sz="1000" b="1" dirty="0" err="1">
+                <a:solidFill>
+                  <a:schemeClr val="tx1"/>
+                </a:solidFill>
+                <a:latin typeface="Arial" panose="020B0604020202020204" pitchFamily="34" charset="0"/>
+                <a:cs typeface="Arial" panose="020B0604020202020204" pitchFamily="34" charset="0"/>
+              </a:rPr>
+              <a:t>RegNumber</a:t>
+            </a:r>
+            <a:r>
+              <a:rPr lang="en-US" sz="1000" b="1" dirty="0">
+                <a:solidFill>
+                  <a:schemeClr val="tx1"/>
+                </a:solidFill>
+                <a:latin typeface="Arial" panose="020B0604020202020204" pitchFamily="34" charset="0"/>
+                <a:cs typeface="Arial" panose="020B0604020202020204" pitchFamily="34" charset="0"/>
+              </a:rPr>
+              <a:t>";</a:t>
+            </a:r>
+          </a:p>
+          <a:p>
+            <a:r>
+              <a:rPr lang="en-US" sz="1000" b="1" dirty="0" err="1">
+                <a:solidFill>
+                  <a:schemeClr val="tx1"/>
+                </a:solidFill>
+                <a:latin typeface="Arial" panose="020B0604020202020204" pitchFamily="34" charset="0"/>
+                <a:cs typeface="Arial" panose="020B0604020202020204" pitchFamily="34" charset="0"/>
+              </a:rPr>
+              <a:t>this.m_tag_day</a:t>
+            </a:r>
+            <a:r>
+              <a:rPr lang="en-US" sz="1000" b="1" dirty="0">
+                <a:solidFill>
+                  <a:schemeClr val="tx1"/>
+                </a:solidFill>
+                <a:latin typeface="Arial" panose="020B0604020202020204" pitchFamily="34" charset="0"/>
+                <a:cs typeface="Arial" panose="020B0604020202020204" pitchFamily="34" charset="0"/>
+              </a:rPr>
+              <a:t> = "Day";</a:t>
+            </a:r>
+          </a:p>
+          <a:p>
+            <a:r>
+              <a:rPr lang="en-US" sz="1000" b="1" dirty="0" err="1">
+                <a:solidFill>
+                  <a:schemeClr val="tx1"/>
+                </a:solidFill>
+                <a:latin typeface="Arial" panose="020B0604020202020204" pitchFamily="34" charset="0"/>
+                <a:cs typeface="Arial" panose="020B0604020202020204" pitchFamily="34" charset="0"/>
+              </a:rPr>
+              <a:t>this.m_tag_month</a:t>
+            </a:r>
+            <a:r>
+              <a:rPr lang="en-US" sz="1000" b="1" dirty="0">
+                <a:solidFill>
+                  <a:schemeClr val="tx1"/>
+                </a:solidFill>
+                <a:latin typeface="Arial" panose="020B0604020202020204" pitchFamily="34" charset="0"/>
+                <a:cs typeface="Arial" panose="020B0604020202020204" pitchFamily="34" charset="0"/>
+              </a:rPr>
+              <a:t> = "Month";</a:t>
+            </a:r>
+          </a:p>
+          <a:p>
+            <a:r>
+              <a:rPr lang="en-US" sz="1000" b="1" dirty="0" err="1">
+                <a:solidFill>
+                  <a:schemeClr val="tx1"/>
+                </a:solidFill>
+                <a:latin typeface="Arial" panose="020B0604020202020204" pitchFamily="34" charset="0"/>
+                <a:cs typeface="Arial" panose="020B0604020202020204" pitchFamily="34" charset="0"/>
+              </a:rPr>
+              <a:t>this.m_tag_year</a:t>
+            </a:r>
+            <a:r>
+              <a:rPr lang="en-US" sz="1000" b="1" dirty="0">
+                <a:solidFill>
+                  <a:schemeClr val="tx1"/>
+                </a:solidFill>
+                <a:latin typeface="Arial" panose="020B0604020202020204" pitchFamily="34" charset="0"/>
+                <a:cs typeface="Arial" panose="020B0604020202020204" pitchFamily="34" charset="0"/>
+              </a:rPr>
+              <a:t> = "Year";</a:t>
+            </a:r>
+          </a:p>
+          <a:p>
+            <a:r>
+              <a:rPr lang="en-US" sz="1000" b="1" dirty="0" err="1">
+                <a:solidFill>
+                  <a:schemeClr val="tx1"/>
+                </a:solidFill>
+                <a:latin typeface="Arial" panose="020B0604020202020204" pitchFamily="34" charset="0"/>
+                <a:cs typeface="Arial" panose="020B0604020202020204" pitchFamily="34" charset="0"/>
+              </a:rPr>
+              <a:t>this.m_tag_start_hour</a:t>
+            </a:r>
+            <a:r>
+              <a:rPr lang="en-US" sz="1000" b="1" dirty="0">
+                <a:solidFill>
+                  <a:schemeClr val="tx1"/>
+                </a:solidFill>
+                <a:latin typeface="Arial" panose="020B0604020202020204" pitchFamily="34" charset="0"/>
+                <a:cs typeface="Arial" panose="020B0604020202020204" pitchFamily="34" charset="0"/>
+              </a:rPr>
+              <a:t> = "</a:t>
+            </a:r>
+            <a:r>
+              <a:rPr lang="en-US" sz="1000" b="1" dirty="0" err="1">
+                <a:solidFill>
+                  <a:schemeClr val="tx1"/>
+                </a:solidFill>
+                <a:latin typeface="Arial" panose="020B0604020202020204" pitchFamily="34" charset="0"/>
+                <a:cs typeface="Arial" panose="020B0604020202020204" pitchFamily="34" charset="0"/>
+              </a:rPr>
+              <a:t>TimeStartHour</a:t>
+            </a:r>
+            <a:r>
+              <a:rPr lang="en-US" sz="1000" b="1" dirty="0">
+                <a:solidFill>
+                  <a:schemeClr val="tx1"/>
+                </a:solidFill>
+                <a:latin typeface="Arial" panose="020B0604020202020204" pitchFamily="34" charset="0"/>
+                <a:cs typeface="Arial" panose="020B0604020202020204" pitchFamily="34" charset="0"/>
+              </a:rPr>
+              <a:t>";</a:t>
+            </a:r>
+          </a:p>
+          <a:p>
+            <a:r>
+              <a:rPr lang="en-US" sz="1000" b="1" dirty="0" err="1">
+                <a:solidFill>
+                  <a:schemeClr val="tx1"/>
+                </a:solidFill>
+                <a:latin typeface="Arial" panose="020B0604020202020204" pitchFamily="34" charset="0"/>
+                <a:cs typeface="Arial" panose="020B0604020202020204" pitchFamily="34" charset="0"/>
+              </a:rPr>
+              <a:t>this.m_tag_start_minute</a:t>
+            </a:r>
+            <a:r>
+              <a:rPr lang="en-US" sz="1000" b="1" dirty="0">
+                <a:solidFill>
+                  <a:schemeClr val="tx1"/>
+                </a:solidFill>
+                <a:latin typeface="Arial" panose="020B0604020202020204" pitchFamily="34" charset="0"/>
+                <a:cs typeface="Arial" panose="020B0604020202020204" pitchFamily="34" charset="0"/>
+              </a:rPr>
+              <a:t> = "</a:t>
+            </a:r>
+            <a:r>
+              <a:rPr lang="en-US" sz="1000" b="1" dirty="0" err="1">
+                <a:solidFill>
+                  <a:schemeClr val="tx1"/>
+                </a:solidFill>
+                <a:latin typeface="Arial" panose="020B0604020202020204" pitchFamily="34" charset="0"/>
+                <a:cs typeface="Arial" panose="020B0604020202020204" pitchFamily="34" charset="0"/>
+              </a:rPr>
+              <a:t>TimeStartMinute</a:t>
+            </a:r>
+            <a:r>
+              <a:rPr lang="en-US" sz="1000" b="1" dirty="0">
+                <a:solidFill>
+                  <a:schemeClr val="tx1"/>
+                </a:solidFill>
+                <a:latin typeface="Arial" panose="020B0604020202020204" pitchFamily="34" charset="0"/>
+                <a:cs typeface="Arial" panose="020B0604020202020204" pitchFamily="34" charset="0"/>
+              </a:rPr>
+              <a:t>";</a:t>
+            </a:r>
+          </a:p>
+          <a:p>
+            <a:r>
+              <a:rPr lang="en-US" sz="1000" b="1" dirty="0" err="1">
+                <a:solidFill>
+                  <a:schemeClr val="tx1"/>
+                </a:solidFill>
+                <a:latin typeface="Arial" panose="020B0604020202020204" pitchFamily="34" charset="0"/>
+                <a:cs typeface="Arial" panose="020B0604020202020204" pitchFamily="34" charset="0"/>
+              </a:rPr>
+              <a:t>this.m_tag_end_hour</a:t>
+            </a:r>
+            <a:r>
+              <a:rPr lang="en-US" sz="1000" b="1" dirty="0">
+                <a:solidFill>
+                  <a:schemeClr val="tx1"/>
+                </a:solidFill>
+                <a:latin typeface="Arial" panose="020B0604020202020204" pitchFamily="34" charset="0"/>
+                <a:cs typeface="Arial" panose="020B0604020202020204" pitchFamily="34" charset="0"/>
+              </a:rPr>
+              <a:t> = "</a:t>
+            </a:r>
+            <a:r>
+              <a:rPr lang="en-US" sz="1000" b="1" dirty="0" err="1">
+                <a:solidFill>
+                  <a:schemeClr val="tx1"/>
+                </a:solidFill>
+                <a:latin typeface="Arial" panose="020B0604020202020204" pitchFamily="34" charset="0"/>
+                <a:cs typeface="Arial" panose="020B0604020202020204" pitchFamily="34" charset="0"/>
+              </a:rPr>
+              <a:t>TimeEndHour</a:t>
+            </a:r>
+            <a:r>
+              <a:rPr lang="en-US" sz="1000" b="1" dirty="0">
+                <a:solidFill>
+                  <a:schemeClr val="tx1"/>
+                </a:solidFill>
+                <a:latin typeface="Arial" panose="020B0604020202020204" pitchFamily="34" charset="0"/>
+                <a:cs typeface="Arial" panose="020B0604020202020204" pitchFamily="34" charset="0"/>
+              </a:rPr>
+              <a:t>";</a:t>
+            </a:r>
+          </a:p>
+          <a:p>
+            <a:r>
+              <a:rPr lang="en-US" sz="1000" b="1" dirty="0" err="1">
+                <a:solidFill>
+                  <a:schemeClr val="tx1"/>
+                </a:solidFill>
+                <a:latin typeface="Arial" panose="020B0604020202020204" pitchFamily="34" charset="0"/>
+                <a:cs typeface="Arial" panose="020B0604020202020204" pitchFamily="34" charset="0"/>
+              </a:rPr>
+              <a:t>this.m_tag_end_minute</a:t>
+            </a:r>
+            <a:r>
+              <a:rPr lang="en-US" sz="1000" b="1" dirty="0">
+                <a:solidFill>
+                  <a:schemeClr val="tx1"/>
+                </a:solidFill>
+                <a:latin typeface="Arial" panose="020B0604020202020204" pitchFamily="34" charset="0"/>
+                <a:cs typeface="Arial" panose="020B0604020202020204" pitchFamily="34" charset="0"/>
+              </a:rPr>
+              <a:t> = "</a:t>
+            </a:r>
+            <a:r>
+              <a:rPr lang="en-US" sz="1000" b="1" dirty="0" err="1">
+                <a:solidFill>
+                  <a:schemeClr val="tx1"/>
+                </a:solidFill>
+                <a:latin typeface="Arial" panose="020B0604020202020204" pitchFamily="34" charset="0"/>
+                <a:cs typeface="Arial" panose="020B0604020202020204" pitchFamily="34" charset="0"/>
+              </a:rPr>
+              <a:t>TimeEndMinute</a:t>
+            </a:r>
+            <a:r>
+              <a:rPr lang="en-US" sz="1000" b="1" dirty="0">
+                <a:solidFill>
+                  <a:schemeClr val="tx1"/>
+                </a:solidFill>
+                <a:latin typeface="Arial" panose="020B0604020202020204" pitchFamily="34" charset="0"/>
+                <a:cs typeface="Arial" panose="020B0604020202020204" pitchFamily="34" charset="0"/>
+              </a:rPr>
+              <a:t>";</a:t>
+            </a:r>
+          </a:p>
+          <a:p>
+            <a:r>
+              <a:rPr lang="en-US" sz="1000" b="1" dirty="0" err="1">
+                <a:solidFill>
+                  <a:schemeClr val="tx1"/>
+                </a:solidFill>
+                <a:latin typeface="Arial" panose="020B0604020202020204" pitchFamily="34" charset="0"/>
+                <a:cs typeface="Arial" panose="020B0604020202020204" pitchFamily="34" charset="0"/>
+              </a:rPr>
+              <a:t>this.m_tag_place</a:t>
+            </a:r>
+            <a:r>
+              <a:rPr lang="en-US" sz="1000" b="1" dirty="0">
+                <a:solidFill>
+                  <a:schemeClr val="tx1"/>
+                </a:solidFill>
+                <a:latin typeface="Arial" panose="020B0604020202020204" pitchFamily="34" charset="0"/>
+                <a:cs typeface="Arial" panose="020B0604020202020204" pitchFamily="34" charset="0"/>
+              </a:rPr>
+              <a:t> = "Place";</a:t>
+            </a:r>
+          </a:p>
+          <a:p>
+            <a:r>
+              <a:rPr lang="en-US" sz="1000" b="1" dirty="0" err="1">
+                <a:solidFill>
+                  <a:schemeClr val="tx1"/>
+                </a:solidFill>
+                <a:latin typeface="Arial" panose="020B0604020202020204" pitchFamily="34" charset="0"/>
+                <a:cs typeface="Arial" panose="020B0604020202020204" pitchFamily="34" charset="0"/>
+              </a:rPr>
+              <a:t>this.m_tag_address</a:t>
+            </a:r>
+            <a:r>
+              <a:rPr lang="en-US" sz="1000" b="1" dirty="0">
+                <a:solidFill>
+                  <a:schemeClr val="tx1"/>
+                </a:solidFill>
+                <a:latin typeface="Arial" panose="020B0604020202020204" pitchFamily="34" charset="0"/>
+                <a:cs typeface="Arial" panose="020B0604020202020204" pitchFamily="34" charset="0"/>
+              </a:rPr>
+              <a:t> = "Address";</a:t>
+            </a:r>
+          </a:p>
+          <a:p>
+            <a:r>
+              <a:rPr lang="en-US" sz="1000" b="1" dirty="0" err="1">
+                <a:solidFill>
+                  <a:schemeClr val="tx1"/>
+                </a:solidFill>
+                <a:latin typeface="Arial" panose="020B0604020202020204" pitchFamily="34" charset="0"/>
+                <a:cs typeface="Arial" panose="020B0604020202020204" pitchFamily="34" charset="0"/>
+              </a:rPr>
+              <a:t>this.m_tag_event_cancelled</a:t>
+            </a:r>
+            <a:r>
+              <a:rPr lang="en-US" sz="1000" b="1" dirty="0">
+                <a:solidFill>
+                  <a:schemeClr val="tx1"/>
+                </a:solidFill>
+                <a:latin typeface="Arial" panose="020B0604020202020204" pitchFamily="34" charset="0"/>
+                <a:cs typeface="Arial" panose="020B0604020202020204" pitchFamily="34" charset="0"/>
+              </a:rPr>
+              <a:t> = "</a:t>
+            </a:r>
+            <a:r>
+              <a:rPr lang="en-US" sz="1000" b="1" dirty="0" err="1">
+                <a:solidFill>
+                  <a:schemeClr val="tx1"/>
+                </a:solidFill>
+                <a:latin typeface="Arial" panose="020B0604020202020204" pitchFamily="34" charset="0"/>
+                <a:cs typeface="Arial" panose="020B0604020202020204" pitchFamily="34" charset="0"/>
+              </a:rPr>
+              <a:t>EventCancelled</a:t>
+            </a:r>
+            <a:r>
+              <a:rPr lang="en-US" sz="1000" b="1" dirty="0">
+                <a:solidFill>
+                  <a:schemeClr val="tx1"/>
+                </a:solidFill>
+                <a:latin typeface="Arial" panose="020B0604020202020204" pitchFamily="34" charset="0"/>
+                <a:cs typeface="Arial" panose="020B0604020202020204" pitchFamily="34" charset="0"/>
+              </a:rPr>
+              <a:t>";</a:t>
+            </a:r>
+          </a:p>
+          <a:p>
+            <a:r>
+              <a:rPr lang="en-US" sz="1000" b="1" dirty="0" err="1">
+                <a:solidFill>
+                  <a:schemeClr val="tx1"/>
+                </a:solidFill>
+                <a:latin typeface="Arial" panose="020B0604020202020204" pitchFamily="34" charset="0"/>
+                <a:cs typeface="Arial" panose="020B0604020202020204" pitchFamily="34" charset="0"/>
+              </a:rPr>
+              <a:t>this.m_tag_event_name</a:t>
+            </a:r>
+            <a:r>
+              <a:rPr lang="en-US" sz="1000" b="1" dirty="0">
+                <a:solidFill>
+                  <a:schemeClr val="tx1"/>
+                </a:solidFill>
+                <a:latin typeface="Arial" panose="020B0604020202020204" pitchFamily="34" charset="0"/>
+                <a:cs typeface="Arial" panose="020B0604020202020204" pitchFamily="34" charset="0"/>
+              </a:rPr>
+              <a:t> = "</a:t>
+            </a:r>
+            <a:r>
+              <a:rPr lang="en-US" sz="1000" b="1" dirty="0" err="1">
+                <a:solidFill>
+                  <a:schemeClr val="tx1"/>
+                </a:solidFill>
+                <a:latin typeface="Arial" panose="020B0604020202020204" pitchFamily="34" charset="0"/>
+                <a:cs typeface="Arial" panose="020B0604020202020204" pitchFamily="34" charset="0"/>
+              </a:rPr>
+              <a:t>EventName</a:t>
+            </a:r>
+            <a:r>
+              <a:rPr lang="en-US" sz="1000" b="1" dirty="0">
+                <a:solidFill>
+                  <a:schemeClr val="tx1"/>
+                </a:solidFill>
+                <a:latin typeface="Arial" panose="020B0604020202020204" pitchFamily="34" charset="0"/>
+                <a:cs typeface="Arial" panose="020B0604020202020204" pitchFamily="34" charset="0"/>
+              </a:rPr>
+              <a:t>";</a:t>
+            </a:r>
+          </a:p>
+          <a:p>
+            <a:r>
+              <a:rPr lang="en-US" sz="1000" b="1" dirty="0" err="1">
+                <a:solidFill>
+                  <a:schemeClr val="tx1"/>
+                </a:solidFill>
+                <a:latin typeface="Arial" panose="020B0604020202020204" pitchFamily="34" charset="0"/>
+                <a:cs typeface="Arial" panose="020B0604020202020204" pitchFamily="34" charset="0"/>
+              </a:rPr>
+              <a:t>this.m_tag_short_text</a:t>
+            </a:r>
+            <a:r>
+              <a:rPr lang="en-US" sz="1000" b="1" dirty="0">
+                <a:solidFill>
+                  <a:schemeClr val="tx1"/>
+                </a:solidFill>
+                <a:latin typeface="Arial" panose="020B0604020202020204" pitchFamily="34" charset="0"/>
+                <a:cs typeface="Arial" panose="020B0604020202020204" pitchFamily="34" charset="0"/>
+              </a:rPr>
+              <a:t> = "</a:t>
+            </a:r>
+            <a:r>
+              <a:rPr lang="en-US" sz="1000" b="1" dirty="0" err="1">
+                <a:solidFill>
+                  <a:schemeClr val="tx1"/>
+                </a:solidFill>
+                <a:latin typeface="Arial" panose="020B0604020202020204" pitchFamily="34" charset="0"/>
+                <a:cs typeface="Arial" panose="020B0604020202020204" pitchFamily="34" charset="0"/>
+              </a:rPr>
+              <a:t>ShortText</a:t>
+            </a:r>
+            <a:r>
+              <a:rPr lang="en-US" sz="1000" b="1" dirty="0">
+                <a:solidFill>
+                  <a:schemeClr val="tx1"/>
+                </a:solidFill>
+                <a:latin typeface="Arial" panose="020B0604020202020204" pitchFamily="34" charset="0"/>
+                <a:cs typeface="Arial" panose="020B0604020202020204" pitchFamily="34" charset="0"/>
+              </a:rPr>
+              <a:t>";</a:t>
+            </a:r>
+          </a:p>
+          <a:p>
+            <a:r>
+              <a:rPr lang="en-US" sz="1000" b="1" dirty="0" err="1">
+                <a:solidFill>
+                  <a:schemeClr val="tx1"/>
+                </a:solidFill>
+                <a:latin typeface="Arial" panose="020B0604020202020204" pitchFamily="34" charset="0"/>
+                <a:cs typeface="Arial" panose="020B0604020202020204" pitchFamily="34" charset="0"/>
+              </a:rPr>
+              <a:t>this.m_tag_url_reservation_dir</a:t>
+            </a:r>
+            <a:r>
+              <a:rPr lang="en-US" sz="1000" b="1" dirty="0">
+                <a:solidFill>
+                  <a:schemeClr val="tx1"/>
+                </a:solidFill>
+                <a:latin typeface="Arial" panose="020B0604020202020204" pitchFamily="34" charset="0"/>
+                <a:cs typeface="Arial" panose="020B0604020202020204" pitchFamily="34" charset="0"/>
+              </a:rPr>
+              <a:t> = "</a:t>
+            </a:r>
+            <a:r>
+              <a:rPr lang="en-US" sz="1000" b="1" dirty="0" err="1">
+                <a:solidFill>
+                  <a:schemeClr val="tx1"/>
+                </a:solidFill>
+                <a:latin typeface="Arial" panose="020B0604020202020204" pitchFamily="34" charset="0"/>
+                <a:cs typeface="Arial" panose="020B0604020202020204" pitchFamily="34" charset="0"/>
+              </a:rPr>
+              <a:t>UrlReservationDir</a:t>
+            </a:r>
+            <a:r>
+              <a:rPr lang="en-US" sz="1000" b="1" dirty="0">
+                <a:solidFill>
+                  <a:schemeClr val="tx1"/>
+                </a:solidFill>
+                <a:latin typeface="Arial" panose="020B0604020202020204" pitchFamily="34" charset="0"/>
+                <a:cs typeface="Arial" panose="020B0604020202020204" pitchFamily="34" charset="0"/>
+              </a:rPr>
+              <a:t>";</a:t>
+            </a:r>
+          </a:p>
+          <a:p>
+            <a:r>
+              <a:rPr lang="en-US" sz="1000" b="1" dirty="0" err="1">
+                <a:solidFill>
+                  <a:schemeClr val="tx1"/>
+                </a:solidFill>
+                <a:latin typeface="Arial" panose="020B0604020202020204" pitchFamily="34" charset="0"/>
+                <a:cs typeface="Arial" panose="020B0604020202020204" pitchFamily="34" charset="0"/>
+              </a:rPr>
+              <a:t>this.m_tag_prices</a:t>
+            </a:r>
+            <a:r>
+              <a:rPr lang="en-US" sz="1000" b="1" dirty="0">
+                <a:solidFill>
+                  <a:schemeClr val="tx1"/>
+                </a:solidFill>
+                <a:latin typeface="Arial" panose="020B0604020202020204" pitchFamily="34" charset="0"/>
+                <a:cs typeface="Arial" panose="020B0604020202020204" pitchFamily="34" charset="0"/>
+              </a:rPr>
+              <a:t> = "Prices";</a:t>
+            </a:r>
+          </a:p>
+          <a:p>
+            <a:r>
+              <a:rPr lang="en-US" sz="1000" b="1" dirty="0" err="1">
+                <a:solidFill>
+                  <a:schemeClr val="tx1"/>
+                </a:solidFill>
+                <a:latin typeface="Arial" panose="020B0604020202020204" pitchFamily="34" charset="0"/>
+                <a:cs typeface="Arial" panose="020B0604020202020204" pitchFamily="34" charset="0"/>
+              </a:rPr>
+              <a:t>this.m_tag_instructions</a:t>
+            </a:r>
+            <a:r>
+              <a:rPr lang="en-US" sz="1000" b="1" dirty="0">
+                <a:solidFill>
+                  <a:schemeClr val="tx1"/>
+                </a:solidFill>
+                <a:latin typeface="Arial" panose="020B0604020202020204" pitchFamily="34" charset="0"/>
+                <a:cs typeface="Arial" panose="020B0604020202020204" pitchFamily="34" charset="0"/>
+              </a:rPr>
+              <a:t> = "Instructions";</a:t>
+            </a:r>
+          </a:p>
+          <a:p>
+            <a:r>
+              <a:rPr lang="en-US" sz="1000" b="1" dirty="0" err="1">
+                <a:solidFill>
+                  <a:schemeClr val="tx1"/>
+                </a:solidFill>
+                <a:latin typeface="Arial" panose="020B0604020202020204" pitchFamily="34" charset="0"/>
+                <a:cs typeface="Arial" panose="020B0604020202020204" pitchFamily="34" charset="0"/>
+              </a:rPr>
+              <a:t>this.m_tag_max_reservations</a:t>
+            </a:r>
+            <a:r>
+              <a:rPr lang="en-US" sz="1000" b="1" dirty="0">
+                <a:solidFill>
+                  <a:schemeClr val="tx1"/>
+                </a:solidFill>
+                <a:latin typeface="Arial" panose="020B0604020202020204" pitchFamily="34" charset="0"/>
+                <a:cs typeface="Arial" panose="020B0604020202020204" pitchFamily="34" charset="0"/>
+              </a:rPr>
+              <a:t> = "</a:t>
+            </a:r>
+            <a:r>
+              <a:rPr lang="en-US" sz="1000" b="1" dirty="0" err="1">
+                <a:solidFill>
+                  <a:schemeClr val="tx1"/>
+                </a:solidFill>
+                <a:latin typeface="Arial" panose="020B0604020202020204" pitchFamily="34" charset="0"/>
+                <a:cs typeface="Arial" panose="020B0604020202020204" pitchFamily="34" charset="0"/>
+              </a:rPr>
+              <a:t>MaxReservations</a:t>
+            </a:r>
+            <a:r>
+              <a:rPr lang="en-US" sz="1000" b="1" dirty="0">
+                <a:solidFill>
+                  <a:schemeClr val="tx1"/>
+                </a:solidFill>
+                <a:latin typeface="Arial" panose="020B0604020202020204" pitchFamily="34" charset="0"/>
+                <a:cs typeface="Arial" panose="020B0604020202020204" pitchFamily="34" charset="0"/>
+              </a:rPr>
+              <a:t>";</a:t>
+            </a:r>
+          </a:p>
+          <a:p>
+            <a:r>
+              <a:rPr lang="en-US" sz="1000" b="1" dirty="0" err="1">
+                <a:solidFill>
+                  <a:schemeClr val="tx1"/>
+                </a:solidFill>
+                <a:latin typeface="Arial" panose="020B0604020202020204" pitchFamily="34" charset="0"/>
+                <a:cs typeface="Arial" panose="020B0604020202020204" pitchFamily="34" charset="0"/>
+              </a:rPr>
+              <a:t>this.m_tag_email_subject</a:t>
+            </a:r>
+            <a:r>
+              <a:rPr lang="en-US" sz="1000" b="1" dirty="0">
+                <a:solidFill>
+                  <a:schemeClr val="tx1"/>
+                </a:solidFill>
+                <a:latin typeface="Arial" panose="020B0604020202020204" pitchFamily="34" charset="0"/>
+                <a:cs typeface="Arial" panose="020B0604020202020204" pitchFamily="34" charset="0"/>
+              </a:rPr>
+              <a:t> = "</a:t>
+            </a:r>
+            <a:r>
+              <a:rPr lang="en-US" sz="1000" b="1" dirty="0" err="1">
+                <a:solidFill>
+                  <a:schemeClr val="tx1"/>
+                </a:solidFill>
+                <a:latin typeface="Arial" panose="020B0604020202020204" pitchFamily="34" charset="0"/>
+                <a:cs typeface="Arial" panose="020B0604020202020204" pitchFamily="34" charset="0"/>
+              </a:rPr>
+              <a:t>EmailSubject</a:t>
+            </a:r>
+            <a:r>
+              <a:rPr lang="en-US" sz="1000" b="1" dirty="0">
+                <a:solidFill>
+                  <a:schemeClr val="tx1"/>
+                </a:solidFill>
+                <a:latin typeface="Arial" panose="020B0604020202020204" pitchFamily="34" charset="0"/>
+                <a:cs typeface="Arial" panose="020B0604020202020204" pitchFamily="34" charset="0"/>
+              </a:rPr>
+              <a:t>";</a:t>
+            </a:r>
+          </a:p>
+          <a:p>
+            <a:r>
+              <a:rPr lang="en-US" sz="1000" b="1" dirty="0" err="1">
+                <a:solidFill>
+                  <a:schemeClr val="tx1"/>
+                </a:solidFill>
+                <a:latin typeface="Arial" panose="020B0604020202020204" pitchFamily="34" charset="0"/>
+                <a:cs typeface="Arial" panose="020B0604020202020204" pitchFamily="34" charset="0"/>
+              </a:rPr>
+              <a:t>this.m_tag_email_header</a:t>
+            </a:r>
+            <a:r>
+              <a:rPr lang="en-US" sz="1000" b="1" dirty="0">
+                <a:solidFill>
+                  <a:schemeClr val="tx1"/>
+                </a:solidFill>
+                <a:latin typeface="Arial" panose="020B0604020202020204" pitchFamily="34" charset="0"/>
+                <a:cs typeface="Arial" panose="020B0604020202020204" pitchFamily="34" charset="0"/>
+              </a:rPr>
+              <a:t> = "</a:t>
+            </a:r>
+            <a:r>
+              <a:rPr lang="en-US" sz="1000" b="1" dirty="0" err="1">
+                <a:solidFill>
+                  <a:schemeClr val="tx1"/>
+                </a:solidFill>
+                <a:latin typeface="Arial" panose="020B0604020202020204" pitchFamily="34" charset="0"/>
+                <a:cs typeface="Arial" panose="020B0604020202020204" pitchFamily="34" charset="0"/>
+              </a:rPr>
+              <a:t>EmailHeader</a:t>
+            </a:r>
+            <a:r>
+              <a:rPr lang="en-US" sz="1000" b="1" dirty="0">
+                <a:solidFill>
+                  <a:schemeClr val="tx1"/>
+                </a:solidFill>
+                <a:latin typeface="Arial" panose="020B0604020202020204" pitchFamily="34" charset="0"/>
+                <a:cs typeface="Arial" panose="020B0604020202020204" pitchFamily="34" charset="0"/>
+              </a:rPr>
+              <a:t>";</a:t>
+            </a:r>
+          </a:p>
+          <a:p>
+            <a:r>
+              <a:rPr lang="en-US" sz="1000" b="1" dirty="0" err="1">
+                <a:solidFill>
+                  <a:schemeClr val="tx1"/>
+                </a:solidFill>
+                <a:latin typeface="Arial" panose="020B0604020202020204" pitchFamily="34" charset="0"/>
+                <a:cs typeface="Arial" panose="020B0604020202020204" pitchFamily="34" charset="0"/>
+              </a:rPr>
+              <a:t>this.m_tag_email_content</a:t>
+            </a:r>
+            <a:r>
+              <a:rPr lang="en-US" sz="1000" b="1" dirty="0">
+                <a:solidFill>
+                  <a:schemeClr val="tx1"/>
+                </a:solidFill>
+                <a:latin typeface="Arial" panose="020B0604020202020204" pitchFamily="34" charset="0"/>
+                <a:cs typeface="Arial" panose="020B0604020202020204" pitchFamily="34" charset="0"/>
+              </a:rPr>
+              <a:t> = "</a:t>
+            </a:r>
+            <a:r>
+              <a:rPr lang="en-US" sz="1000" b="1" dirty="0" err="1">
+                <a:solidFill>
+                  <a:schemeClr val="tx1"/>
+                </a:solidFill>
+                <a:latin typeface="Arial" panose="020B0604020202020204" pitchFamily="34" charset="0"/>
+                <a:cs typeface="Arial" panose="020B0604020202020204" pitchFamily="34" charset="0"/>
+              </a:rPr>
+              <a:t>EmailContent</a:t>
+            </a:r>
+            <a:r>
+              <a:rPr lang="en-US" sz="1000" b="1" dirty="0">
+                <a:solidFill>
+                  <a:schemeClr val="tx1"/>
+                </a:solidFill>
+                <a:latin typeface="Arial" panose="020B0604020202020204" pitchFamily="34" charset="0"/>
+                <a:cs typeface="Arial" panose="020B0604020202020204" pitchFamily="34" charset="0"/>
+              </a:rPr>
+              <a:t>";</a:t>
+            </a:r>
+          </a:p>
+          <a:p>
+            <a:r>
+              <a:rPr lang="en-US" sz="1000" b="1" dirty="0" err="1">
+                <a:solidFill>
+                  <a:schemeClr val="tx1"/>
+                </a:solidFill>
+                <a:latin typeface="Arial" panose="020B0604020202020204" pitchFamily="34" charset="0"/>
+                <a:cs typeface="Arial" panose="020B0604020202020204" pitchFamily="34" charset="0"/>
+              </a:rPr>
+              <a:t>this.m_tag_email_seats</a:t>
+            </a:r>
+            <a:r>
+              <a:rPr lang="en-US" sz="1000" b="1" dirty="0">
+                <a:solidFill>
+                  <a:schemeClr val="tx1"/>
+                </a:solidFill>
+                <a:latin typeface="Arial" panose="020B0604020202020204" pitchFamily="34" charset="0"/>
+                <a:cs typeface="Arial" panose="020B0604020202020204" pitchFamily="34" charset="0"/>
+              </a:rPr>
+              <a:t> = "</a:t>
+            </a:r>
+            <a:r>
+              <a:rPr lang="en-US" sz="1000" b="1" dirty="0" err="1">
+                <a:solidFill>
+                  <a:schemeClr val="tx1"/>
+                </a:solidFill>
+                <a:latin typeface="Arial" panose="020B0604020202020204" pitchFamily="34" charset="0"/>
+                <a:cs typeface="Arial" panose="020B0604020202020204" pitchFamily="34" charset="0"/>
+              </a:rPr>
+              <a:t>EmailSeats</a:t>
+            </a:r>
+            <a:r>
+              <a:rPr lang="en-US" sz="1000" b="1" dirty="0">
+                <a:solidFill>
+                  <a:schemeClr val="tx1"/>
+                </a:solidFill>
+                <a:latin typeface="Arial" panose="020B0604020202020204" pitchFamily="34" charset="0"/>
+                <a:cs typeface="Arial" panose="020B0604020202020204" pitchFamily="34" charset="0"/>
+              </a:rPr>
+              <a:t>";</a:t>
+            </a:r>
+          </a:p>
+          <a:p>
+            <a:r>
+              <a:rPr lang="en-US" sz="1000" b="1" dirty="0" err="1">
+                <a:solidFill>
+                  <a:schemeClr val="tx1"/>
+                </a:solidFill>
+                <a:latin typeface="Arial" panose="020B0604020202020204" pitchFamily="34" charset="0"/>
+                <a:cs typeface="Arial" panose="020B0604020202020204" pitchFamily="34" charset="0"/>
+              </a:rPr>
+              <a:t>this.m_tag_pay_method</a:t>
+            </a:r>
+            <a:r>
+              <a:rPr lang="en-US" sz="1000" b="1" dirty="0">
+                <a:solidFill>
+                  <a:schemeClr val="tx1"/>
+                </a:solidFill>
+                <a:latin typeface="Arial" panose="020B0604020202020204" pitchFamily="34" charset="0"/>
+                <a:cs typeface="Arial" panose="020B0604020202020204" pitchFamily="34" charset="0"/>
+              </a:rPr>
+              <a:t> = "</a:t>
+            </a:r>
+            <a:r>
+              <a:rPr lang="en-US" sz="1000" b="1" dirty="0" err="1">
+                <a:solidFill>
+                  <a:schemeClr val="tx1"/>
+                </a:solidFill>
+                <a:latin typeface="Arial" panose="020B0604020202020204" pitchFamily="34" charset="0"/>
+                <a:cs typeface="Arial" panose="020B0604020202020204" pitchFamily="34" charset="0"/>
+              </a:rPr>
+              <a:t>PayMethod</a:t>
+            </a:r>
+            <a:r>
+              <a:rPr lang="en-US" sz="1000" b="1" dirty="0">
+                <a:solidFill>
+                  <a:schemeClr val="tx1"/>
+                </a:solidFill>
+                <a:latin typeface="Arial" panose="020B0604020202020204" pitchFamily="34" charset="0"/>
+                <a:cs typeface="Arial" panose="020B0604020202020204" pitchFamily="34" charset="0"/>
+              </a:rPr>
+              <a:t>";</a:t>
+            </a:r>
+          </a:p>
+        </p:txBody>
+      </p:sp>
+      <p:sp>
+        <p:nvSpPr>
+          <p:cNvPr id="4" name="Rechteck 3">
+            <a:extLst>
+              <a:ext uri="{FF2B5EF4-FFF2-40B4-BE49-F238E27FC236}">
+                <a16:creationId xmlns:a16="http://schemas.microsoft.com/office/drawing/2014/main" id="{E89A05A6-6622-B6CD-462A-138AF8CB57E0}"/>
+              </a:ext>
+            </a:extLst>
+          </p:cNvPr>
+          <p:cNvSpPr/>
+          <p:nvPr/>
+        </p:nvSpPr>
+        <p:spPr>
+          <a:xfrm>
+            <a:off x="730310" y="687631"/>
+            <a:ext cx="6678406" cy="570469"/>
+          </a:xfrm>
+          <a:prstGeom prst="rect">
+            <a:avLst/>
+          </a:prstGeom>
+          <a:noFill/>
+          <a:ln w="19050">
+            <a:solidFill>
+              <a:schemeClr val="tx1"/>
+            </a:solidFill>
+          </a:ln>
+        </p:spPr>
+        <p:style>
+          <a:lnRef idx="2">
+            <a:schemeClr val="accent1">
+              <a:shade val="50000"/>
+            </a:schemeClr>
+          </a:lnRef>
+          <a:fillRef idx="1">
+            <a:schemeClr val="accent1"/>
+          </a:fillRef>
+          <a:effectRef idx="0">
+            <a:schemeClr val="accent1"/>
+          </a:effectRef>
+          <a:fontRef idx="minor">
+            <a:schemeClr val="lt1"/>
+          </a:fontRef>
+        </p:style>
+        <p:txBody>
+          <a:bodyPr rtlCol="0" anchor="ctr"/>
+          <a:lstStyle/>
+          <a:p>
+            <a:pPr algn="ctr"/>
+            <a:r>
+              <a:rPr lang="de-CH" b="1" dirty="0" err="1">
+                <a:solidFill>
+                  <a:schemeClr val="tx1"/>
+                </a:solidFill>
+                <a:latin typeface="Arial" panose="020B0604020202020204" pitchFamily="34" charset="0"/>
+                <a:cs typeface="Arial" panose="020B0604020202020204" pitchFamily="34" charset="0"/>
+              </a:rPr>
+              <a:t>EventProgramXml</a:t>
+            </a:r>
+            <a:endParaRPr lang="de-CH" b="1" dirty="0">
+              <a:solidFill>
+                <a:schemeClr val="tx1"/>
+              </a:solidFill>
+              <a:latin typeface="Arial" panose="020B0604020202020204" pitchFamily="34" charset="0"/>
+              <a:cs typeface="Arial" panose="020B0604020202020204" pitchFamily="34" charset="0"/>
+            </a:endParaRPr>
+          </a:p>
+          <a:p>
+            <a:pPr algn="ctr"/>
+            <a:r>
+              <a:rPr lang="en-US" sz="1400" dirty="0">
+                <a:solidFill>
+                  <a:schemeClr val="tx1"/>
+                </a:solidFill>
+                <a:latin typeface="Arial" panose="020B0604020202020204" pitchFamily="34" charset="0"/>
+                <a:cs typeface="Arial" panose="020B0604020202020204" pitchFamily="34" charset="0"/>
+              </a:rPr>
+              <a:t>Handles an event program</a:t>
+            </a:r>
+            <a:endParaRPr lang="de-CH" sz="1400" dirty="0">
+              <a:solidFill>
+                <a:schemeClr val="tx1"/>
+              </a:solidFill>
+              <a:latin typeface="Arial" panose="020B0604020202020204" pitchFamily="34" charset="0"/>
+              <a:cs typeface="Arial" panose="020B0604020202020204" pitchFamily="34" charset="0"/>
+            </a:endParaRPr>
+          </a:p>
+        </p:txBody>
+      </p:sp>
+      <p:sp>
+        <p:nvSpPr>
+          <p:cNvPr id="5" name="Rechteck 4">
+            <a:extLst>
+              <a:ext uri="{FF2B5EF4-FFF2-40B4-BE49-F238E27FC236}">
+                <a16:creationId xmlns:a16="http://schemas.microsoft.com/office/drawing/2014/main" id="{877F1337-A9DE-6C8A-7DB0-30C5761C44BE}"/>
+              </a:ext>
+            </a:extLst>
+          </p:cNvPr>
+          <p:cNvSpPr/>
+          <p:nvPr/>
+        </p:nvSpPr>
+        <p:spPr>
+          <a:xfrm>
+            <a:off x="730308" y="1258100"/>
+            <a:ext cx="6678408" cy="4675109"/>
+          </a:xfrm>
+          <a:prstGeom prst="rect">
+            <a:avLst/>
+          </a:prstGeom>
+          <a:noFill/>
+          <a:ln w="19050">
+            <a:solidFill>
+              <a:schemeClr val="tx1"/>
+            </a:solidFill>
+          </a:ln>
+        </p:spPr>
+        <p:style>
+          <a:lnRef idx="2">
+            <a:schemeClr val="accent1">
+              <a:shade val="50000"/>
+            </a:schemeClr>
+          </a:lnRef>
+          <a:fillRef idx="1">
+            <a:schemeClr val="accent1"/>
+          </a:fillRef>
+          <a:effectRef idx="0">
+            <a:schemeClr val="accent1"/>
+          </a:effectRef>
+          <a:fontRef idx="minor">
+            <a:schemeClr val="lt1"/>
+          </a:fontRef>
+        </p:style>
+        <p:txBody>
+          <a:bodyPr rtlCol="0" anchor="ctr"/>
+          <a:lstStyle/>
+          <a:p>
+            <a:r>
+              <a:rPr lang="en-US" sz="1000" b="1" dirty="0">
+                <a:solidFill>
+                  <a:schemeClr val="tx1"/>
+                </a:solidFill>
+                <a:latin typeface="Arial" panose="020B0604020202020204" pitchFamily="34" charset="0"/>
+                <a:cs typeface="Arial" panose="020B0604020202020204" pitchFamily="34" charset="0"/>
+              </a:rPr>
+              <a:t>constructor(</a:t>
+            </a:r>
+            <a:r>
+              <a:rPr lang="en-US" sz="1000" b="1" dirty="0" err="1">
+                <a:solidFill>
+                  <a:schemeClr val="tx1"/>
+                </a:solidFill>
+                <a:latin typeface="Arial" panose="020B0604020202020204" pitchFamily="34" charset="0"/>
+                <a:cs typeface="Arial" panose="020B0604020202020204" pitchFamily="34" charset="0"/>
+              </a:rPr>
+              <a:t>i_subdir_xml</a:t>
+            </a:r>
+            <a:r>
+              <a:rPr lang="en-US" sz="1000" b="1" dirty="0">
+                <a:solidFill>
+                  <a:schemeClr val="tx1"/>
+                </a:solidFill>
+                <a:latin typeface="Arial" panose="020B0604020202020204" pitchFamily="34" charset="0"/>
+                <a:cs typeface="Arial" panose="020B0604020202020204" pitchFamily="34" charset="0"/>
+              </a:rPr>
+              <a:t>, </a:t>
+            </a:r>
+            <a:r>
+              <a:rPr lang="en-US" sz="1000" b="1" dirty="0" err="1">
+                <a:solidFill>
+                  <a:schemeClr val="tx1"/>
+                </a:solidFill>
+                <a:latin typeface="Arial" panose="020B0604020202020204" pitchFamily="34" charset="0"/>
+                <a:cs typeface="Arial" panose="020B0604020202020204" pitchFamily="34" charset="0"/>
+              </a:rPr>
+              <a:t>i_event_program_file_name</a:t>
+            </a:r>
+            <a:r>
+              <a:rPr lang="en-US" sz="1000" b="1" dirty="0">
+                <a:solidFill>
+                  <a:schemeClr val="tx1"/>
+                </a:solidFill>
+                <a:latin typeface="Arial" panose="020B0604020202020204" pitchFamily="34" charset="0"/>
+                <a:cs typeface="Arial" panose="020B0604020202020204" pitchFamily="34" charset="0"/>
+              </a:rPr>
+              <a:t>, </a:t>
+            </a:r>
+            <a:r>
+              <a:rPr lang="en-US" sz="1000" b="1" dirty="0" err="1">
+                <a:solidFill>
+                  <a:schemeClr val="tx1"/>
+                </a:solidFill>
+                <a:latin typeface="Arial" panose="020B0604020202020204" pitchFamily="34" charset="0"/>
+                <a:cs typeface="Arial" panose="020B0604020202020204" pitchFamily="34" charset="0"/>
+              </a:rPr>
+              <a:t>i_callback_function_name</a:t>
+            </a:r>
+            <a:r>
+              <a:rPr lang="en-US" sz="1000" b="1" dirty="0">
+                <a:solidFill>
+                  <a:schemeClr val="tx1"/>
+                </a:solidFill>
+                <a:latin typeface="Arial" panose="020B0604020202020204" pitchFamily="34" charset="0"/>
+                <a:cs typeface="Arial" panose="020B0604020202020204" pitchFamily="34" charset="0"/>
+              </a:rPr>
+              <a:t>) </a:t>
+            </a:r>
+          </a:p>
+          <a:p>
+            <a:r>
+              <a:rPr lang="en-US" sz="1000" b="1" dirty="0">
+                <a:solidFill>
+                  <a:schemeClr val="tx1"/>
+                </a:solidFill>
+                <a:latin typeface="Arial" panose="020B0604020202020204" pitchFamily="34" charset="0"/>
+                <a:cs typeface="Arial" panose="020B0604020202020204" pitchFamily="34" charset="0"/>
+              </a:rPr>
+              <a:t>{</a:t>
+            </a:r>
+          </a:p>
+          <a:p>
+            <a:r>
+              <a:rPr lang="en-US" sz="1000" b="1" dirty="0">
+                <a:solidFill>
+                  <a:schemeClr val="tx1"/>
+                </a:solidFill>
+                <a:latin typeface="Arial" panose="020B0604020202020204" pitchFamily="34" charset="0"/>
+                <a:cs typeface="Arial" panose="020B0604020202020204" pitchFamily="34" charset="0"/>
+              </a:rPr>
+              <a:t>  </a:t>
+            </a:r>
+            <a:r>
+              <a:rPr lang="en-US" sz="1000" b="1" i="1" dirty="0">
+                <a:solidFill>
+                  <a:schemeClr val="tx1"/>
+                </a:solidFill>
+                <a:latin typeface="Arial" panose="020B0604020202020204" pitchFamily="34" charset="0"/>
+                <a:cs typeface="Arial" panose="020B0604020202020204" pitchFamily="34" charset="0"/>
+              </a:rPr>
+              <a:t>The subdirectory for the event XML file, e.g. </a:t>
+            </a:r>
+            <a:r>
+              <a:rPr lang="en-US" sz="1000" b="1" i="1" dirty="0" err="1">
+                <a:solidFill>
+                  <a:schemeClr val="tx1"/>
+                </a:solidFill>
+                <a:latin typeface="Arial" panose="020B0604020202020204" pitchFamily="34" charset="0"/>
+                <a:cs typeface="Arial" panose="020B0604020202020204" pitchFamily="34" charset="0"/>
+              </a:rPr>
+              <a:t>SaisonXml</a:t>
+            </a:r>
+            <a:endParaRPr lang="en-US" sz="1000" b="1" i="1" dirty="0">
+              <a:solidFill>
+                <a:schemeClr val="tx1"/>
+              </a:solidFill>
+              <a:latin typeface="Arial" panose="020B0604020202020204" pitchFamily="34" charset="0"/>
+              <a:cs typeface="Arial" panose="020B0604020202020204" pitchFamily="34" charset="0"/>
+            </a:endParaRPr>
+          </a:p>
+          <a:p>
+            <a:r>
+              <a:rPr lang="en-US" sz="1000" b="1" dirty="0">
+                <a:solidFill>
+                  <a:schemeClr val="tx1"/>
+                </a:solidFill>
+                <a:latin typeface="Arial" panose="020B0604020202020204" pitchFamily="34" charset="0"/>
+                <a:cs typeface="Arial" panose="020B0604020202020204" pitchFamily="34" charset="0"/>
+              </a:rPr>
+              <a:t>  </a:t>
+            </a:r>
+            <a:r>
+              <a:rPr lang="en-US" sz="1000" b="1" dirty="0" err="1">
+                <a:solidFill>
+                  <a:schemeClr val="tx1"/>
+                </a:solidFill>
+                <a:latin typeface="Arial" panose="020B0604020202020204" pitchFamily="34" charset="0"/>
+                <a:cs typeface="Arial" panose="020B0604020202020204" pitchFamily="34" charset="0"/>
+              </a:rPr>
+              <a:t>this.m_subdir_xml</a:t>
+            </a:r>
+            <a:r>
+              <a:rPr lang="en-US" sz="1000" b="1" dirty="0">
+                <a:solidFill>
+                  <a:schemeClr val="tx1"/>
+                </a:solidFill>
+                <a:latin typeface="Arial" panose="020B0604020202020204" pitchFamily="34" charset="0"/>
+                <a:cs typeface="Arial" panose="020B0604020202020204" pitchFamily="34" charset="0"/>
+              </a:rPr>
+              <a:t> = </a:t>
+            </a:r>
+            <a:r>
+              <a:rPr lang="en-US" sz="1000" b="1" dirty="0" err="1">
+                <a:solidFill>
+                  <a:schemeClr val="tx1"/>
+                </a:solidFill>
+                <a:latin typeface="Arial" panose="020B0604020202020204" pitchFamily="34" charset="0"/>
+                <a:cs typeface="Arial" panose="020B0604020202020204" pitchFamily="34" charset="0"/>
+              </a:rPr>
+              <a:t>i_subdir_xml</a:t>
+            </a:r>
+            <a:r>
+              <a:rPr lang="en-US" sz="1000" b="1" dirty="0">
+                <a:solidFill>
+                  <a:schemeClr val="tx1"/>
+                </a:solidFill>
+                <a:latin typeface="Arial" panose="020B0604020202020204" pitchFamily="34" charset="0"/>
+                <a:cs typeface="Arial" panose="020B0604020202020204" pitchFamily="34" charset="0"/>
+              </a:rPr>
+              <a:t>;</a:t>
+            </a:r>
+          </a:p>
+          <a:p>
+            <a:r>
+              <a:rPr lang="en-US" sz="1000" b="1" dirty="0">
+                <a:solidFill>
+                  <a:schemeClr val="tx1"/>
+                </a:solidFill>
+                <a:latin typeface="Arial" panose="020B0604020202020204" pitchFamily="34" charset="0"/>
+                <a:cs typeface="Arial" panose="020B0604020202020204" pitchFamily="34" charset="0"/>
+              </a:rPr>
+              <a:t>  </a:t>
+            </a:r>
+            <a:r>
+              <a:rPr lang="en-US" sz="1000" b="1" i="1" dirty="0">
+                <a:solidFill>
+                  <a:schemeClr val="tx1"/>
+                </a:solidFill>
+                <a:latin typeface="Arial" panose="020B0604020202020204" pitchFamily="34" charset="0"/>
+                <a:cs typeface="Arial" panose="020B0604020202020204" pitchFamily="34" charset="0"/>
+              </a:rPr>
+              <a:t>Name of the event program XML file</a:t>
+            </a:r>
+          </a:p>
+          <a:p>
+            <a:r>
+              <a:rPr lang="en-US" sz="1000" b="1" dirty="0">
+                <a:solidFill>
+                  <a:schemeClr val="tx1"/>
+                </a:solidFill>
+                <a:latin typeface="Arial" panose="020B0604020202020204" pitchFamily="34" charset="0"/>
+                <a:cs typeface="Arial" panose="020B0604020202020204" pitchFamily="34" charset="0"/>
+              </a:rPr>
+              <a:t>  </a:t>
+            </a:r>
+            <a:r>
+              <a:rPr lang="en-US" sz="1000" b="1" dirty="0" err="1">
+                <a:solidFill>
+                  <a:schemeClr val="tx1"/>
+                </a:solidFill>
+                <a:latin typeface="Arial" panose="020B0604020202020204" pitchFamily="34" charset="0"/>
+                <a:cs typeface="Arial" panose="020B0604020202020204" pitchFamily="34" charset="0"/>
+              </a:rPr>
+              <a:t>this.m_event_program_file_name</a:t>
+            </a:r>
+            <a:r>
+              <a:rPr lang="en-US" sz="1000" b="1" dirty="0">
+                <a:solidFill>
+                  <a:schemeClr val="tx1"/>
+                </a:solidFill>
+                <a:latin typeface="Arial" panose="020B0604020202020204" pitchFamily="34" charset="0"/>
+                <a:cs typeface="Arial" panose="020B0604020202020204" pitchFamily="34" charset="0"/>
+              </a:rPr>
+              <a:t> = </a:t>
+            </a:r>
+            <a:r>
+              <a:rPr lang="en-US" sz="1000" b="1" dirty="0" err="1">
+                <a:solidFill>
+                  <a:schemeClr val="tx1"/>
+                </a:solidFill>
+                <a:latin typeface="Arial" panose="020B0604020202020204" pitchFamily="34" charset="0"/>
+                <a:cs typeface="Arial" panose="020B0604020202020204" pitchFamily="34" charset="0"/>
+              </a:rPr>
+              <a:t>i_event_program_file_name</a:t>
+            </a:r>
+            <a:r>
+              <a:rPr lang="en-US" sz="1000" b="1" dirty="0">
+                <a:solidFill>
+                  <a:schemeClr val="tx1"/>
+                </a:solidFill>
+                <a:latin typeface="Arial" panose="020B0604020202020204" pitchFamily="34" charset="0"/>
+                <a:cs typeface="Arial" panose="020B0604020202020204" pitchFamily="34" charset="0"/>
+              </a:rPr>
+              <a:t>;</a:t>
+            </a:r>
+          </a:p>
+          <a:p>
+            <a:r>
+              <a:rPr lang="en-US" sz="1000" b="1" dirty="0">
+                <a:solidFill>
+                  <a:schemeClr val="tx1"/>
+                </a:solidFill>
+                <a:latin typeface="Arial" panose="020B0604020202020204" pitchFamily="34" charset="0"/>
+                <a:cs typeface="Arial" panose="020B0604020202020204" pitchFamily="34" charset="0"/>
+              </a:rPr>
+              <a:t>  </a:t>
+            </a:r>
+            <a:r>
+              <a:rPr lang="en-US" sz="1000" b="1" i="1" dirty="0">
+                <a:solidFill>
+                  <a:schemeClr val="tx1"/>
+                </a:solidFill>
+                <a:latin typeface="Arial" panose="020B0604020202020204" pitchFamily="34" charset="0"/>
+                <a:cs typeface="Arial" panose="020B0604020202020204" pitchFamily="34" charset="0"/>
+              </a:rPr>
+              <a:t>Call back function name</a:t>
+            </a:r>
+          </a:p>
+          <a:p>
+            <a:r>
+              <a:rPr lang="en-US" sz="1000" b="1" dirty="0">
+                <a:solidFill>
+                  <a:schemeClr val="tx1"/>
+                </a:solidFill>
+                <a:latin typeface="Arial" panose="020B0604020202020204" pitchFamily="34" charset="0"/>
+                <a:cs typeface="Arial" panose="020B0604020202020204" pitchFamily="34" charset="0"/>
+              </a:rPr>
+              <a:t>  </a:t>
+            </a:r>
+            <a:r>
+              <a:rPr lang="en-US" sz="1000" b="1" dirty="0" err="1">
+                <a:solidFill>
+                  <a:schemeClr val="tx1"/>
+                </a:solidFill>
+                <a:latin typeface="Arial" panose="020B0604020202020204" pitchFamily="34" charset="0"/>
+                <a:cs typeface="Arial" panose="020B0604020202020204" pitchFamily="34" charset="0"/>
+              </a:rPr>
+              <a:t>this.m_callback_function_name</a:t>
+            </a:r>
+            <a:r>
+              <a:rPr lang="en-US" sz="1000" b="1" dirty="0">
+                <a:solidFill>
+                  <a:schemeClr val="tx1"/>
+                </a:solidFill>
+                <a:latin typeface="Arial" panose="020B0604020202020204" pitchFamily="34" charset="0"/>
+                <a:cs typeface="Arial" panose="020B0604020202020204" pitchFamily="34" charset="0"/>
+              </a:rPr>
+              <a:t> = </a:t>
+            </a:r>
+            <a:r>
+              <a:rPr lang="en-US" sz="1000" b="1" dirty="0" err="1">
+                <a:solidFill>
+                  <a:schemeClr val="tx1"/>
+                </a:solidFill>
+                <a:latin typeface="Arial" panose="020B0604020202020204" pitchFamily="34" charset="0"/>
+                <a:cs typeface="Arial" panose="020B0604020202020204" pitchFamily="34" charset="0"/>
+              </a:rPr>
+              <a:t>i_callback_function_name</a:t>
+            </a:r>
+            <a:r>
+              <a:rPr lang="en-US" sz="1000" b="1" dirty="0">
+                <a:solidFill>
+                  <a:schemeClr val="tx1"/>
+                </a:solidFill>
+                <a:latin typeface="Arial" panose="020B0604020202020204" pitchFamily="34" charset="0"/>
+                <a:cs typeface="Arial" panose="020B0604020202020204" pitchFamily="34" charset="0"/>
+              </a:rPr>
+              <a:t>;</a:t>
+            </a:r>
+          </a:p>
+          <a:p>
+            <a:r>
+              <a:rPr lang="en-US" sz="1000" b="1" dirty="0">
+                <a:solidFill>
+                  <a:schemeClr val="tx1"/>
+                </a:solidFill>
+                <a:latin typeface="Arial" panose="020B0604020202020204" pitchFamily="34" charset="0"/>
+                <a:cs typeface="Arial" panose="020B0604020202020204" pitchFamily="34" charset="0"/>
+              </a:rPr>
+              <a:t>  </a:t>
+            </a:r>
+            <a:r>
+              <a:rPr lang="en-US" sz="1000" b="1" i="1" dirty="0">
+                <a:solidFill>
+                  <a:schemeClr val="tx1"/>
+                </a:solidFill>
+                <a:latin typeface="Arial" panose="020B0604020202020204" pitchFamily="34" charset="0"/>
+                <a:cs typeface="Arial" panose="020B0604020202020204" pitchFamily="34" charset="0"/>
+              </a:rPr>
+              <a:t>Object holding the tags</a:t>
+            </a:r>
+          </a:p>
+          <a:p>
+            <a:r>
+              <a:rPr lang="en-US" sz="1000" b="1" dirty="0">
+                <a:solidFill>
+                  <a:schemeClr val="tx1"/>
+                </a:solidFill>
+                <a:latin typeface="Arial" panose="020B0604020202020204" pitchFamily="34" charset="0"/>
+                <a:cs typeface="Arial" panose="020B0604020202020204" pitchFamily="34" charset="0"/>
+              </a:rPr>
+              <a:t>  </a:t>
+            </a:r>
+            <a:r>
+              <a:rPr lang="en-US" sz="1000" b="1" dirty="0" err="1">
+                <a:solidFill>
+                  <a:schemeClr val="tx1"/>
+                </a:solidFill>
+                <a:latin typeface="Arial" panose="020B0604020202020204" pitchFamily="34" charset="0"/>
+                <a:cs typeface="Arial" panose="020B0604020202020204" pitchFamily="34" charset="0"/>
+              </a:rPr>
+              <a:t>this.m_tags</a:t>
+            </a:r>
+            <a:r>
+              <a:rPr lang="en-US" sz="1000" b="1" dirty="0">
+                <a:solidFill>
+                  <a:schemeClr val="tx1"/>
+                </a:solidFill>
+                <a:latin typeface="Arial" panose="020B0604020202020204" pitchFamily="34" charset="0"/>
+                <a:cs typeface="Arial" panose="020B0604020202020204" pitchFamily="34" charset="0"/>
+              </a:rPr>
+              <a:t> = new </a:t>
+            </a:r>
+            <a:r>
+              <a:rPr lang="en-US" sz="1000" b="1" dirty="0" err="1">
+                <a:solidFill>
+                  <a:schemeClr val="tx1"/>
+                </a:solidFill>
+                <a:latin typeface="Arial" panose="020B0604020202020204" pitchFamily="34" charset="0"/>
+                <a:cs typeface="Arial" panose="020B0604020202020204" pitchFamily="34" charset="0"/>
+              </a:rPr>
+              <a:t>EventProgramTags</a:t>
+            </a:r>
+            <a:r>
+              <a:rPr lang="en-US" sz="1000" b="1" dirty="0">
+                <a:solidFill>
+                  <a:schemeClr val="tx1"/>
+                </a:solidFill>
+                <a:latin typeface="Arial" panose="020B0604020202020204" pitchFamily="34" charset="0"/>
+                <a:cs typeface="Arial" panose="020B0604020202020204" pitchFamily="34" charset="0"/>
+              </a:rPr>
+              <a:t>();</a:t>
+            </a:r>
+          </a:p>
+          <a:p>
+            <a:r>
+              <a:rPr lang="en-US" sz="1000" b="1" i="1" dirty="0">
+                <a:solidFill>
+                  <a:schemeClr val="tx1"/>
+                </a:solidFill>
+                <a:latin typeface="Arial" panose="020B0604020202020204" pitchFamily="34" charset="0"/>
+                <a:cs typeface="Arial" panose="020B0604020202020204" pitchFamily="34" charset="0"/>
+              </a:rPr>
+              <a:t>  Loads the XML event file, creates the XML object and calls the function </a:t>
+            </a:r>
+            <a:r>
+              <a:rPr lang="en-US" sz="1000" b="1" i="1" dirty="0" err="1">
+                <a:solidFill>
+                  <a:schemeClr val="tx1"/>
+                </a:solidFill>
+                <a:latin typeface="Arial" panose="020B0604020202020204" pitchFamily="34" charset="0"/>
+                <a:cs typeface="Arial" panose="020B0604020202020204" pitchFamily="34" charset="0"/>
+              </a:rPr>
+              <a:t>m_callback_function_name</a:t>
+            </a:r>
+            <a:endParaRPr lang="en-US" sz="1000" b="1" i="1" dirty="0">
+              <a:solidFill>
+                <a:schemeClr val="tx1"/>
+              </a:solidFill>
+              <a:latin typeface="Arial" panose="020B0604020202020204" pitchFamily="34" charset="0"/>
+              <a:cs typeface="Arial" panose="020B0604020202020204" pitchFamily="34" charset="0"/>
+            </a:endParaRPr>
+          </a:p>
+          <a:p>
+            <a:r>
+              <a:rPr lang="en-US" sz="1000" b="1" dirty="0">
+                <a:solidFill>
+                  <a:schemeClr val="tx1"/>
+                </a:solidFill>
+                <a:latin typeface="Arial" panose="020B0604020202020204" pitchFamily="34" charset="0"/>
+                <a:cs typeface="Arial" panose="020B0604020202020204" pitchFamily="34" charset="0"/>
+              </a:rPr>
+              <a:t>  </a:t>
+            </a:r>
+            <a:r>
+              <a:rPr lang="en-US" sz="1000" b="1" dirty="0" err="1">
+                <a:solidFill>
+                  <a:schemeClr val="tx1"/>
+                </a:solidFill>
+                <a:latin typeface="Arial" panose="020B0604020202020204" pitchFamily="34" charset="0"/>
+                <a:cs typeface="Arial" panose="020B0604020202020204" pitchFamily="34" charset="0"/>
+              </a:rPr>
+              <a:t>this.loadOneXmlFile</a:t>
+            </a:r>
+            <a:r>
+              <a:rPr lang="en-US" sz="1000" b="1" dirty="0">
+                <a:solidFill>
+                  <a:schemeClr val="tx1"/>
+                </a:solidFill>
+                <a:latin typeface="Arial" panose="020B0604020202020204" pitchFamily="34" charset="0"/>
+                <a:cs typeface="Arial" panose="020B0604020202020204" pitchFamily="34" charset="0"/>
+              </a:rPr>
+              <a:t>(this, </a:t>
+            </a:r>
+            <a:r>
+              <a:rPr lang="en-US" sz="1000" b="1" dirty="0" err="1">
+                <a:solidFill>
+                  <a:schemeClr val="tx1"/>
+                </a:solidFill>
+                <a:latin typeface="Arial" panose="020B0604020202020204" pitchFamily="34" charset="0"/>
+                <a:cs typeface="Arial" panose="020B0604020202020204" pitchFamily="34" charset="0"/>
+              </a:rPr>
+              <a:t>this.getXmlEventProgramFileName</a:t>
+            </a:r>
+            <a:r>
+              <a:rPr lang="en-US" sz="1000" b="1" dirty="0">
+                <a:solidFill>
+                  <a:schemeClr val="tx1"/>
+                </a:solidFill>
+                <a:latin typeface="Arial" panose="020B0604020202020204" pitchFamily="34" charset="0"/>
+                <a:cs typeface="Arial" panose="020B0604020202020204" pitchFamily="34" charset="0"/>
+              </a:rPr>
+              <a:t>(), </a:t>
+            </a:r>
+            <a:r>
+              <a:rPr lang="en-US" sz="1000" b="1" dirty="0" err="1">
+                <a:solidFill>
+                  <a:schemeClr val="tx1"/>
+                </a:solidFill>
+                <a:latin typeface="Arial" panose="020B0604020202020204" pitchFamily="34" charset="0"/>
+                <a:cs typeface="Arial" panose="020B0604020202020204" pitchFamily="34" charset="0"/>
+              </a:rPr>
+              <a:t>this.m_callback_function_name</a:t>
+            </a:r>
+            <a:r>
+              <a:rPr lang="en-US" sz="1000" b="1" dirty="0">
+                <a:solidFill>
+                  <a:schemeClr val="tx1"/>
+                </a:solidFill>
+                <a:latin typeface="Arial" panose="020B0604020202020204" pitchFamily="34" charset="0"/>
+                <a:cs typeface="Arial" panose="020B0604020202020204" pitchFamily="34" charset="0"/>
+              </a:rPr>
+              <a:t>);</a:t>
+            </a:r>
+          </a:p>
+          <a:p>
+            <a:r>
+              <a:rPr lang="en-US" sz="1000" b="1" dirty="0">
+                <a:solidFill>
+                  <a:schemeClr val="tx1"/>
+                </a:solidFill>
+                <a:latin typeface="Arial" panose="020B0604020202020204" pitchFamily="34" charset="0"/>
+                <a:cs typeface="Arial" panose="020B0604020202020204" pitchFamily="34" charset="0"/>
+              </a:rPr>
+              <a:t>} </a:t>
+            </a:r>
+          </a:p>
+          <a:p>
+            <a:endParaRPr lang="en-US" sz="1000" b="1" dirty="0">
+              <a:solidFill>
+                <a:schemeClr val="tx1"/>
+              </a:solidFill>
+              <a:latin typeface="Arial" panose="020B0604020202020204" pitchFamily="34" charset="0"/>
+              <a:cs typeface="Arial" panose="020B0604020202020204" pitchFamily="34" charset="0"/>
+            </a:endParaRPr>
+          </a:p>
+          <a:p>
+            <a:r>
+              <a:rPr lang="en-US" sz="1000" b="1" dirty="0">
+                <a:solidFill>
+                  <a:schemeClr val="tx1"/>
+                </a:solidFill>
+                <a:latin typeface="Arial" panose="020B0604020202020204" pitchFamily="34" charset="0"/>
+                <a:cs typeface="Arial" panose="020B0604020202020204" pitchFamily="34" charset="0"/>
+              </a:rPr>
+              <a:t>Get and set functions for all XML data (for all tags)</a:t>
+            </a:r>
+          </a:p>
+          <a:p>
+            <a:endParaRPr lang="en-US" sz="1000" b="1" dirty="0">
+              <a:solidFill>
+                <a:schemeClr val="tx1"/>
+              </a:solidFill>
+              <a:latin typeface="Arial" panose="020B0604020202020204" pitchFamily="34" charset="0"/>
+              <a:cs typeface="Arial" panose="020B0604020202020204" pitchFamily="34" charset="0"/>
+            </a:endParaRPr>
+          </a:p>
+          <a:p>
+            <a:r>
+              <a:rPr lang="en-US" sz="1000" b="1" i="1" dirty="0">
+                <a:solidFill>
+                  <a:schemeClr val="tx1"/>
+                </a:solidFill>
+                <a:latin typeface="Arial" panose="020B0604020202020204" pitchFamily="34" charset="0"/>
+                <a:cs typeface="Arial" panose="020B0604020202020204" pitchFamily="34" charset="0"/>
+              </a:rPr>
+              <a:t>Appends an event node   </a:t>
+            </a:r>
+          </a:p>
+          <a:p>
+            <a:r>
+              <a:rPr lang="en-US" sz="1000" b="1" dirty="0" err="1">
+                <a:solidFill>
+                  <a:schemeClr val="tx1"/>
+                </a:solidFill>
+                <a:latin typeface="Arial" panose="020B0604020202020204" pitchFamily="34" charset="0"/>
+                <a:cs typeface="Arial" panose="020B0604020202020204" pitchFamily="34" charset="0"/>
+              </a:rPr>
+              <a:t>appendEventNode</a:t>
+            </a:r>
+            <a:r>
+              <a:rPr lang="en-US" sz="1000" b="1" dirty="0">
+                <a:solidFill>
+                  <a:schemeClr val="tx1"/>
+                </a:solidFill>
+                <a:latin typeface="Arial" panose="020B0604020202020204" pitchFamily="34" charset="0"/>
+                <a:cs typeface="Arial" panose="020B0604020202020204" pitchFamily="34" charset="0"/>
+              </a:rPr>
+              <a:t>()</a:t>
+            </a:r>
+          </a:p>
+          <a:p>
+            <a:endParaRPr lang="en-US" sz="1000" b="1" dirty="0">
+              <a:solidFill>
+                <a:schemeClr val="tx1"/>
+              </a:solidFill>
+              <a:latin typeface="Arial" panose="020B0604020202020204" pitchFamily="34" charset="0"/>
+              <a:cs typeface="Arial" panose="020B0604020202020204" pitchFamily="34" charset="0"/>
+            </a:endParaRPr>
+          </a:p>
+          <a:p>
+            <a:r>
+              <a:rPr lang="en-US" sz="1000" b="1" i="1" dirty="0">
+                <a:solidFill>
+                  <a:schemeClr val="tx1"/>
+                </a:solidFill>
+                <a:latin typeface="Arial" panose="020B0604020202020204" pitchFamily="34" charset="0"/>
+                <a:cs typeface="Arial" panose="020B0604020202020204" pitchFamily="34" charset="0"/>
+              </a:rPr>
+              <a:t>Returns the number of events</a:t>
+            </a:r>
+          </a:p>
+          <a:p>
+            <a:r>
+              <a:rPr lang="en-US" sz="1000" b="1" dirty="0" err="1">
+                <a:solidFill>
+                  <a:schemeClr val="tx1"/>
+                </a:solidFill>
+                <a:latin typeface="Arial" panose="020B0604020202020204" pitchFamily="34" charset="0"/>
+                <a:cs typeface="Arial" panose="020B0604020202020204" pitchFamily="34" charset="0"/>
+              </a:rPr>
+              <a:t>getNumberOfEvents</a:t>
+            </a:r>
+            <a:r>
+              <a:rPr lang="en-US" sz="1000" b="1" dirty="0">
+                <a:solidFill>
+                  <a:schemeClr val="tx1"/>
+                </a:solidFill>
+                <a:latin typeface="Arial" panose="020B0604020202020204" pitchFamily="34" charset="0"/>
+                <a:cs typeface="Arial" panose="020B0604020202020204" pitchFamily="34" charset="0"/>
+              </a:rPr>
+              <a:t>()</a:t>
+            </a:r>
+          </a:p>
+          <a:p>
+            <a:endParaRPr lang="en-US" sz="1000" b="1" dirty="0">
+              <a:solidFill>
+                <a:schemeClr val="tx1"/>
+              </a:solidFill>
+              <a:latin typeface="Arial" panose="020B0604020202020204" pitchFamily="34" charset="0"/>
+              <a:cs typeface="Arial" panose="020B0604020202020204" pitchFamily="34" charset="0"/>
+            </a:endParaRPr>
+          </a:p>
+          <a:p>
+            <a:r>
+              <a:rPr lang="en-US" sz="1000" b="1" i="1" dirty="0">
+                <a:solidFill>
+                  <a:schemeClr val="tx1"/>
+                </a:solidFill>
+                <a:latin typeface="Arial" panose="020B0604020202020204" pitchFamily="34" charset="0"/>
+                <a:cs typeface="Arial" panose="020B0604020202020204" pitchFamily="34" charset="0"/>
+              </a:rPr>
+              <a:t>Returns an array of event names</a:t>
+            </a:r>
+          </a:p>
+          <a:p>
+            <a:r>
+              <a:rPr lang="en-US" sz="1000" b="1" dirty="0" err="1">
+                <a:solidFill>
+                  <a:schemeClr val="tx1"/>
+                </a:solidFill>
+                <a:latin typeface="Arial" panose="020B0604020202020204" pitchFamily="34" charset="0"/>
+                <a:cs typeface="Arial" panose="020B0604020202020204" pitchFamily="34" charset="0"/>
+              </a:rPr>
+              <a:t>getEventNameArray</a:t>
+            </a:r>
+            <a:r>
+              <a:rPr lang="en-US" sz="1000" b="1" dirty="0">
+                <a:solidFill>
+                  <a:schemeClr val="tx1"/>
+                </a:solidFill>
+                <a:latin typeface="Arial" panose="020B0604020202020204" pitchFamily="34" charset="0"/>
+                <a:cs typeface="Arial" panose="020B0604020202020204" pitchFamily="34" charset="0"/>
+              </a:rPr>
+              <a:t>(</a:t>
+            </a:r>
+            <a:r>
+              <a:rPr lang="en-US" sz="1000" b="1" dirty="0" err="1">
+                <a:solidFill>
+                  <a:schemeClr val="tx1"/>
+                </a:solidFill>
+                <a:latin typeface="Arial" panose="020B0604020202020204" pitchFamily="34" charset="0"/>
+                <a:cs typeface="Arial" panose="020B0604020202020204" pitchFamily="34" charset="0"/>
+              </a:rPr>
+              <a:t>i_b_only_coming</a:t>
+            </a:r>
+            <a:r>
+              <a:rPr lang="en-US" sz="1000" b="1" dirty="0">
+                <a:solidFill>
+                  <a:schemeClr val="tx1"/>
+                </a:solidFill>
+                <a:latin typeface="Arial" panose="020B0604020202020204" pitchFamily="34" charset="0"/>
+                <a:cs typeface="Arial" panose="020B0604020202020204" pitchFamily="34" charset="0"/>
+              </a:rPr>
+              <a:t>)</a:t>
+            </a:r>
+          </a:p>
+          <a:p>
+            <a:r>
+              <a:rPr lang="en-US" sz="1000" b="1" dirty="0" err="1">
+                <a:solidFill>
+                  <a:schemeClr val="tx1"/>
+                </a:solidFill>
+                <a:latin typeface="Arial" panose="020B0604020202020204" pitchFamily="34" charset="0"/>
+                <a:cs typeface="Arial" panose="020B0604020202020204" pitchFamily="34" charset="0"/>
+              </a:rPr>
+              <a:t>getDateNameEventArrayStartNumber</a:t>
+            </a:r>
+            <a:r>
+              <a:rPr lang="en-US" sz="1000" b="1" dirty="0">
+                <a:solidFill>
+                  <a:schemeClr val="tx1"/>
+                </a:solidFill>
+                <a:latin typeface="Arial" panose="020B0604020202020204" pitchFamily="34" charset="0"/>
+                <a:cs typeface="Arial" panose="020B0604020202020204" pitchFamily="34" charset="0"/>
+              </a:rPr>
+              <a:t>(</a:t>
+            </a:r>
+            <a:r>
+              <a:rPr lang="en-US" sz="1000" b="1" dirty="0" err="1">
+                <a:solidFill>
+                  <a:schemeClr val="tx1"/>
+                </a:solidFill>
+                <a:latin typeface="Arial" panose="020B0604020202020204" pitchFamily="34" charset="0"/>
+                <a:cs typeface="Arial" panose="020B0604020202020204" pitchFamily="34" charset="0"/>
+              </a:rPr>
+              <a:t>i_b_only_coming</a:t>
+            </a:r>
+            <a:r>
+              <a:rPr lang="en-US" sz="1000" b="1" dirty="0">
+                <a:solidFill>
+                  <a:schemeClr val="tx1"/>
+                </a:solidFill>
+                <a:latin typeface="Arial" panose="020B0604020202020204" pitchFamily="34" charset="0"/>
+                <a:cs typeface="Arial" panose="020B0604020202020204" pitchFamily="34" charset="0"/>
+              </a:rPr>
+              <a:t>)</a:t>
+            </a:r>
+          </a:p>
+          <a:p>
+            <a:r>
+              <a:rPr lang="en-US" sz="1000" b="1" dirty="0" err="1">
+                <a:solidFill>
+                  <a:schemeClr val="tx1"/>
+                </a:solidFill>
+                <a:latin typeface="Arial" panose="020B0604020202020204" pitchFamily="34" charset="0"/>
+                <a:cs typeface="Arial" panose="020B0604020202020204" pitchFamily="34" charset="0"/>
+              </a:rPr>
+              <a:t>getEventDateArray</a:t>
+            </a:r>
+            <a:r>
+              <a:rPr lang="en-US" sz="1000" b="1" dirty="0">
+                <a:solidFill>
+                  <a:schemeClr val="tx1"/>
+                </a:solidFill>
+                <a:latin typeface="Arial" panose="020B0604020202020204" pitchFamily="34" charset="0"/>
+                <a:cs typeface="Arial" panose="020B0604020202020204" pitchFamily="34" charset="0"/>
+              </a:rPr>
+              <a:t>(</a:t>
+            </a:r>
+            <a:r>
+              <a:rPr lang="en-US" sz="1000" b="1" dirty="0" err="1">
+                <a:solidFill>
+                  <a:schemeClr val="tx1"/>
+                </a:solidFill>
+                <a:latin typeface="Arial" panose="020B0604020202020204" pitchFamily="34" charset="0"/>
+                <a:cs typeface="Arial" panose="020B0604020202020204" pitchFamily="34" charset="0"/>
+              </a:rPr>
+              <a:t>i_b_only_coming</a:t>
+            </a:r>
+            <a:r>
+              <a:rPr lang="en-US" sz="1000" b="1" dirty="0">
+                <a:solidFill>
+                  <a:schemeClr val="tx1"/>
+                </a:solidFill>
+                <a:latin typeface="Arial" panose="020B0604020202020204" pitchFamily="34" charset="0"/>
+                <a:cs typeface="Arial" panose="020B0604020202020204" pitchFamily="34" charset="0"/>
+              </a:rPr>
+              <a:t>, </a:t>
+            </a:r>
+            <a:r>
+              <a:rPr lang="en-US" sz="1000" b="1" dirty="0" err="1">
+                <a:solidFill>
+                  <a:schemeClr val="tx1"/>
+                </a:solidFill>
+                <a:latin typeface="Arial" panose="020B0604020202020204" pitchFamily="34" charset="0"/>
+                <a:cs typeface="Arial" panose="020B0604020202020204" pitchFamily="34" charset="0"/>
+              </a:rPr>
+              <a:t>i_date_format</a:t>
+            </a:r>
+            <a:r>
+              <a:rPr lang="en-US" sz="1000" b="1" dirty="0">
+                <a:solidFill>
+                  <a:schemeClr val="tx1"/>
+                </a:solidFill>
+                <a:latin typeface="Arial" panose="020B0604020202020204" pitchFamily="34" charset="0"/>
+                <a:cs typeface="Arial" panose="020B0604020202020204" pitchFamily="34" charset="0"/>
+              </a:rPr>
+              <a:t>)</a:t>
+            </a:r>
+          </a:p>
+          <a:p>
+            <a:r>
+              <a:rPr lang="en-US" sz="1000" b="1" dirty="0" err="1">
+                <a:solidFill>
+                  <a:schemeClr val="tx1"/>
+                </a:solidFill>
+                <a:latin typeface="Arial" panose="020B0604020202020204" pitchFamily="34" charset="0"/>
+                <a:cs typeface="Arial" panose="020B0604020202020204" pitchFamily="34" charset="0"/>
+              </a:rPr>
+              <a:t>getEventNumberForNextEvent</a:t>
+            </a:r>
+            <a:r>
+              <a:rPr lang="en-US" sz="1000" b="1" dirty="0">
+                <a:solidFill>
+                  <a:schemeClr val="tx1"/>
+                </a:solidFill>
+                <a:latin typeface="Arial" panose="020B0604020202020204" pitchFamily="34" charset="0"/>
+                <a:cs typeface="Arial" panose="020B0604020202020204" pitchFamily="34" charset="0"/>
+              </a:rPr>
+              <a:t>()</a:t>
+            </a:r>
+          </a:p>
+          <a:p>
+            <a:r>
+              <a:rPr lang="en-US" sz="1000" b="1" dirty="0" err="1">
+                <a:solidFill>
+                  <a:schemeClr val="tx1"/>
+                </a:solidFill>
+                <a:latin typeface="Arial" panose="020B0604020202020204" pitchFamily="34" charset="0"/>
+                <a:cs typeface="Arial" panose="020B0604020202020204" pitchFamily="34" charset="0"/>
+              </a:rPr>
+              <a:t>getXmlEventProgramFileName</a:t>
+            </a:r>
+            <a:r>
+              <a:rPr lang="en-US" sz="1000" b="1" dirty="0">
+                <a:solidFill>
+                  <a:schemeClr val="tx1"/>
+                </a:solidFill>
+                <a:latin typeface="Arial" panose="020B0604020202020204" pitchFamily="34" charset="0"/>
+                <a:cs typeface="Arial" panose="020B0604020202020204" pitchFamily="34" charset="0"/>
+              </a:rPr>
+              <a:t>()</a:t>
+            </a:r>
+          </a:p>
+          <a:p>
+            <a:endParaRPr lang="en-US" sz="1000" b="1" dirty="0">
+              <a:solidFill>
+                <a:schemeClr val="tx1"/>
+              </a:solidFill>
+              <a:latin typeface="Arial" panose="020B0604020202020204" pitchFamily="34" charset="0"/>
+              <a:cs typeface="Arial" panose="020B0604020202020204" pitchFamily="34" charset="0"/>
+            </a:endParaRPr>
+          </a:p>
+        </p:txBody>
+      </p:sp>
     </p:spTree>
     <p:extLst>
       <p:ext uri="{BB962C8B-B14F-4D97-AF65-F5344CB8AC3E}">
         <p14:creationId xmlns:p14="http://schemas.microsoft.com/office/powerpoint/2010/main" val="2116491267"/>
+      </p:ext>
+    </p:extLst>
+  </p:cSld>
+  <p:clrMapOvr>
+    <a:masterClrMapping/>
+  </p:clrMapOvr>
+</p:sld>
+</file>
+
+<file path=ppt/slides/slide13.xml><?xml version="1.0" encoding="utf-8"?>
+<p:sld xmlns:a="http://schemas.openxmlformats.org/drawingml/2006/main" xmlns:r="http://schemas.openxmlformats.org/officeDocument/2006/relationships" xmlns:p="http://schemas.openxmlformats.org/presentationml/2006/main">
+  <p:cSld>
+    <p:spTree>
+      <p:nvGrpSpPr>
+        <p:cNvPr id="1" name=""/>
+        <p:cNvGrpSpPr/>
+        <p:nvPr/>
+      </p:nvGrpSpPr>
+      <p:grpSpPr>
+        <a:xfrm>
+          <a:off x="0" y="0"/>
+          <a:ext cx="0" cy="0"/>
+          <a:chOff x="0" y="0"/>
+          <a:chExt cx="0" cy="0"/>
+        </a:xfrm>
+      </p:grpSpPr>
+    </p:spTree>
+    <p:extLst>
+      <p:ext uri="{BB962C8B-B14F-4D97-AF65-F5344CB8AC3E}">
+        <p14:creationId xmlns:p14="http://schemas.microsoft.com/office/powerpoint/2010/main" val="998078828"/>
+      </p:ext>
+    </p:extLst>
+  </p:cSld>
+  <p:clrMapOvr>
+    <a:masterClrMapping/>
+  </p:clrMapOvr>
+</p:sld>
+</file>
+
+<file path=ppt/slides/slide14.xml><?xml version="1.0" encoding="utf-8"?>
+<p:sld xmlns:a="http://schemas.openxmlformats.org/drawingml/2006/main" xmlns:r="http://schemas.openxmlformats.org/officeDocument/2006/relationships" xmlns:p="http://schemas.openxmlformats.org/presentationml/2006/main">
+  <p:cSld>
+    <p:spTree>
+      <p:nvGrpSpPr>
+        <p:cNvPr id="1" name=""/>
+        <p:cNvGrpSpPr/>
+        <p:nvPr/>
+      </p:nvGrpSpPr>
+      <p:grpSpPr>
+        <a:xfrm>
+          <a:off x="0" y="0"/>
+          <a:ext cx="0" cy="0"/>
+          <a:chOff x="0" y="0"/>
+          <a:chExt cx="0" cy="0"/>
+        </a:xfrm>
+      </p:grpSpPr>
+    </p:spTree>
+    <p:extLst>
+      <p:ext uri="{BB962C8B-B14F-4D97-AF65-F5344CB8AC3E}">
+        <p14:creationId xmlns:p14="http://schemas.microsoft.com/office/powerpoint/2010/main" val="4194466850"/>
       </p:ext>
     </p:extLst>
   </p:cSld>

</xml_diff>